<commit_message>
final presentation so far
</commit_message>
<xml_diff>
--- a/final_presentation.pptx
+++ b/final_presentation.pptx
@@ -7,14 +7,11 @@
   <p:sldIdLst>
     <p:sldId id="256" r:id="rId2"/>
     <p:sldId id="265" r:id="rId3"/>
-    <p:sldId id="257" r:id="rId4"/>
-    <p:sldId id="258" r:id="rId5"/>
-    <p:sldId id="264" r:id="rId6"/>
-    <p:sldId id="263" r:id="rId7"/>
-    <p:sldId id="259" r:id="rId8"/>
-    <p:sldId id="260" r:id="rId9"/>
-    <p:sldId id="261" r:id="rId10"/>
-    <p:sldId id="262" r:id="rId11"/>
+    <p:sldId id="266" r:id="rId4"/>
+    <p:sldId id="257" r:id="rId5"/>
+    <p:sldId id="267" r:id="rId6"/>
+    <p:sldId id="268" r:id="rId7"/>
+    <p:sldId id="269" r:id="rId8"/>
   </p:sldIdLst>
   <p:sldSz cx="9144000" cy="6858000" type="screen4x3"/>
   <p:notesSz cx="6858000" cy="9144000"/>
@@ -407,7 +404,7 @@
             <a:fld id="{A7380CEA-EB7A-421F-B7C0-8B209A4C3BDD}" type="datetimeFigureOut">
               <a:rPr lang="en-US" smtClean="0"/>
               <a:pPr/>
-              <a:t>4/29/2016</a:t>
+              <a:t>5/3/2016</a:t>
             </a:fld>
             <a:endParaRPr lang="en-US"/>
           </a:p>
@@ -574,7 +571,7 @@
             <a:fld id="{A7380CEA-EB7A-421F-B7C0-8B209A4C3BDD}" type="datetimeFigureOut">
               <a:rPr lang="en-US" smtClean="0"/>
               <a:pPr/>
-              <a:t>4/29/2016</a:t>
+              <a:t>5/3/2016</a:t>
             </a:fld>
             <a:endParaRPr lang="en-US"/>
           </a:p>
@@ -751,7 +748,7 @@
             <a:fld id="{A7380CEA-EB7A-421F-B7C0-8B209A4C3BDD}" type="datetimeFigureOut">
               <a:rPr lang="en-US" smtClean="0"/>
               <a:pPr/>
-              <a:t>4/29/2016</a:t>
+              <a:t>5/3/2016</a:t>
             </a:fld>
             <a:endParaRPr lang="en-US"/>
           </a:p>
@@ -900,7 +897,7 @@
             <a:fld id="{A7380CEA-EB7A-421F-B7C0-8B209A4C3BDD}" type="datetimeFigureOut">
               <a:rPr lang="en-US" smtClean="0"/>
               <a:pPr/>
-              <a:t>4/29/2016</a:t>
+              <a:t>5/3/2016</a:t>
             </a:fld>
             <a:endParaRPr lang="en-US"/>
           </a:p>
@@ -1019,7 +1016,7 @@
             <a:fld id="{A7380CEA-EB7A-421F-B7C0-8B209A4C3BDD}" type="datetimeFigureOut">
               <a:rPr lang="en-US" smtClean="0"/>
               <a:pPr/>
-              <a:t>4/29/2016</a:t>
+              <a:t>5/3/2016</a:t>
             </a:fld>
             <a:endParaRPr lang="en-US"/>
           </a:p>
@@ -1291,7 +1288,7 @@
             <a:fld id="{A7380CEA-EB7A-421F-B7C0-8B209A4C3BDD}" type="datetimeFigureOut">
               <a:rPr lang="en-US" smtClean="0"/>
               <a:pPr/>
-              <a:t>4/29/2016</a:t>
+              <a:t>5/3/2016</a:t>
             </a:fld>
             <a:endParaRPr lang="en-US"/>
           </a:p>
@@ -1563,7 +1560,7 @@
             <a:fld id="{A7380CEA-EB7A-421F-B7C0-8B209A4C3BDD}" type="datetimeFigureOut">
               <a:rPr lang="en-US" smtClean="0"/>
               <a:pPr/>
-              <a:t>4/29/2016</a:t>
+              <a:t>5/3/2016</a:t>
             </a:fld>
             <a:endParaRPr lang="en-US"/>
           </a:p>
@@ -2011,7 +2008,7 @@
             <a:fld id="{A7380CEA-EB7A-421F-B7C0-8B209A4C3BDD}" type="datetimeFigureOut">
               <a:rPr lang="en-US" smtClean="0"/>
               <a:pPr/>
-              <a:t>4/29/2016</a:t>
+              <a:t>5/3/2016</a:t>
             </a:fld>
             <a:endParaRPr lang="en-US"/>
           </a:p>
@@ -2126,7 +2123,7 @@
             <a:fld id="{A7380CEA-EB7A-421F-B7C0-8B209A4C3BDD}" type="datetimeFigureOut">
               <a:rPr lang="en-US" smtClean="0"/>
               <a:pPr/>
-              <a:t>4/29/2016</a:t>
+              <a:t>5/3/2016</a:t>
             </a:fld>
             <a:endParaRPr lang="en-US"/>
           </a:p>
@@ -2378,7 +2375,7 @@
             <a:fld id="{A7380CEA-EB7A-421F-B7C0-8B209A4C3BDD}" type="datetimeFigureOut">
               <a:rPr lang="en-US" smtClean="0"/>
               <a:pPr/>
-              <a:t>4/29/2016</a:t>
+              <a:t>5/3/2016</a:t>
             </a:fld>
             <a:endParaRPr lang="en-US"/>
           </a:p>
@@ -2620,7 +2617,7 @@
             <a:fld id="{A7380CEA-EB7A-421F-B7C0-8B209A4C3BDD}" type="datetimeFigureOut">
               <a:rPr lang="en-US" smtClean="0"/>
               <a:pPr/>
-              <a:t>4/29/2016</a:t>
+              <a:t>5/3/2016</a:t>
             </a:fld>
             <a:endParaRPr lang="en-US"/>
           </a:p>
@@ -2795,7 +2792,7 @@
             <a:fld id="{A7380CEA-EB7A-421F-B7C0-8B209A4C3BDD}" type="datetimeFigureOut">
               <a:rPr lang="en-US" smtClean="0"/>
               <a:pPr/>
-              <a:t>4/29/2016</a:t>
+              <a:t>5/3/2016</a:t>
             </a:fld>
             <a:endParaRPr lang="en-US"/>
           </a:p>
@@ -3578,56 +3575,6 @@
 </p:sld>
 </file>
 
-<file path=ppt/slides/slide10.xml><?xml version="1.0" encoding="utf-8"?>
-<p:sld xmlns:a="http://schemas.openxmlformats.org/drawingml/2006/main" xmlns:r="http://schemas.openxmlformats.org/officeDocument/2006/relationships" xmlns:p="http://schemas.openxmlformats.org/presentationml/2006/main">
-  <p:cSld>
-    <p:spTree>
-      <p:nvGrpSpPr>
-        <p:cNvPr id="1" name=""/>
-        <p:cNvGrpSpPr/>
-        <p:nvPr/>
-      </p:nvGrpSpPr>
-      <p:grpSpPr>
-        <a:xfrm>
-          <a:off x="0" y="0"/>
-          <a:ext cx="0" cy="0"/>
-          <a:chOff x="0" y="0"/>
-          <a:chExt cx="0" cy="0"/>
-        </a:xfrm>
-      </p:grpSpPr>
-      <p:pic>
-        <p:nvPicPr>
-          <p:cNvPr id="6" name="Picture 5" descr="2016-03-25-022316_1920x950_scrot.png"/>
-          <p:cNvPicPr>
-            <a:picLocks noChangeAspect="1"/>
-          </p:cNvPicPr>
-          <p:nvPr/>
-        </p:nvPicPr>
-        <p:blipFill>
-          <a:blip r:embed="rId2" cstate="print"/>
-          <a:srcRect t="806" r="68786" b="43913"/>
-          <a:stretch>
-            <a:fillRect/>
-          </a:stretch>
-        </p:blipFill>
-        <p:spPr>
-          <a:xfrm>
-            <a:off x="838200" y="152400"/>
-            <a:ext cx="7391400" cy="6477000"/>
-          </a:xfrm>
-          <a:prstGeom prst="rect">
-            <a:avLst/>
-          </a:prstGeom>
-        </p:spPr>
-      </p:pic>
-    </p:spTree>
-  </p:cSld>
-  <p:clrMapOvr>
-    <a:masterClrMapping/>
-  </p:clrMapOvr>
-</p:sld>
-</file>
-
 <file path=ppt/slides/slide2.xml><?xml version="1.0" encoding="utf-8"?>
 <p:sld xmlns:a="http://schemas.openxmlformats.org/drawingml/2006/main" xmlns:r="http://schemas.openxmlformats.org/officeDocument/2006/relationships" xmlns:p="http://schemas.openxmlformats.org/presentationml/2006/main">
   <p:cSld>
@@ -3742,74 +3689,24 @@
           <a:lstStyle/>
           <a:p>
             <a:r>
-              <a:rPr lang="en-US" dirty="0" smtClean="0">
-                <a:latin typeface="Arial" pitchFamily="34" charset="0"/>
-                <a:cs typeface="Arial" pitchFamily="34" charset="0"/>
-              </a:rPr>
-              <a:t>Our project will be adding to an existing project called Pokémon </a:t>
-            </a:r>
-            <a:r>
-              <a:rPr lang="en-US" dirty="0" err="1" smtClean="0">
-                <a:latin typeface="Arial" pitchFamily="34" charset="0"/>
-                <a:cs typeface="Arial" pitchFamily="34" charset="0"/>
-              </a:rPr>
-              <a:t>Snowdown</a:t>
-            </a:r>
-            <a:r>
-              <a:rPr lang="en-US" dirty="0" smtClean="0">
-                <a:latin typeface="Arial" pitchFamily="34" charset="0"/>
-                <a:cs typeface="Arial" pitchFamily="34" charset="0"/>
-              </a:rPr>
-              <a:t> located at </a:t>
-            </a:r>
-            <a:r>
-              <a:rPr lang="en-US" dirty="0" smtClean="0">
-                <a:latin typeface="Arial" pitchFamily="34" charset="0"/>
-                <a:cs typeface="Arial" pitchFamily="34" charset="0"/>
-                <a:hlinkClick r:id="rId2"/>
-              </a:rPr>
-              <a:t>https://github.com/maZang/PokeSnowdown</a:t>
-            </a:r>
-            <a:endParaRPr lang="en-US" dirty="0" smtClean="0">
-              <a:latin typeface="Arial" pitchFamily="34" charset="0"/>
-              <a:cs typeface="Arial" pitchFamily="34" charset="0"/>
-            </a:endParaRPr>
-          </a:p>
-          <a:p>
-            <a:r>
-              <a:rPr lang="en-US" dirty="0" smtClean="0">
-                <a:latin typeface="Arial" pitchFamily="34" charset="0"/>
-                <a:cs typeface="Arial" pitchFamily="34" charset="0"/>
-              </a:rPr>
-              <a:t>Pokémon </a:t>
-            </a:r>
-            <a:r>
-              <a:rPr lang="en-US" dirty="0" err="1" smtClean="0">
-                <a:latin typeface="Arial" pitchFamily="34" charset="0"/>
-                <a:cs typeface="Arial" pitchFamily="34" charset="0"/>
-              </a:rPr>
-              <a:t>Snowdown</a:t>
-            </a:r>
-            <a:r>
-              <a:rPr lang="en-US" dirty="0" smtClean="0">
-                <a:latin typeface="Arial" pitchFamily="34" charset="0"/>
-                <a:cs typeface="Arial" pitchFamily="34" charset="0"/>
-              </a:rPr>
-              <a:t> is a working Pokémon battle simulator however due to time constraints the creators were not able to implement all of content from the actual Pokémon games.</a:t>
-            </a:r>
-          </a:p>
-          <a:p>
-            <a:r>
-              <a:rPr lang="en-US" dirty="0" smtClean="0">
-                <a:latin typeface="Arial" pitchFamily="34" charset="0"/>
-                <a:cs typeface="Arial" pitchFamily="34" charset="0"/>
-              </a:rPr>
-              <a:t>We wish to append some of the information they did not include, such as adding missing moves/items.</a:t>
-            </a:r>
-            <a:endParaRPr lang="en-US" dirty="0">
-              <a:latin typeface="Arial" pitchFamily="34" charset="0"/>
-              <a:cs typeface="Arial" pitchFamily="34" charset="0"/>
-            </a:endParaRPr>
+              <a:rPr lang="en-US" dirty="0" smtClean="0"/>
+              <a:t>OCaml</a:t>
+            </a:r>
+          </a:p>
+          <a:p>
+            <a:r>
+              <a:rPr lang="en-US" dirty="0" smtClean="0"/>
+              <a:t>JSON</a:t>
+            </a:r>
+          </a:p>
+          <a:p>
+            <a:r>
+              <a:rPr lang="en-US" dirty="0" smtClean="0"/>
+              <a:t>Python</a:t>
+            </a:r>
+          </a:p>
+          <a:p>
+            <a:endParaRPr lang="en-US" dirty="0"/>
           </a:p>
         </p:txBody>
       </p:sp>
@@ -3829,16 +3726,10 @@
           <a:lstStyle/>
           <a:p>
             <a:r>
-              <a:rPr lang="en-US" dirty="0" smtClean="0">
-                <a:latin typeface="Arial" pitchFamily="34" charset="0"/>
-                <a:cs typeface="Arial" pitchFamily="34" charset="0"/>
-              </a:rPr>
-              <a:t>Proposal	</a:t>
-            </a:r>
-            <a:endParaRPr lang="en-US" dirty="0">
-              <a:latin typeface="Arial" pitchFamily="34" charset="0"/>
-              <a:cs typeface="Arial" pitchFamily="34" charset="0"/>
-            </a:endParaRPr>
+              <a:rPr lang="en-US" dirty="0" smtClean="0"/>
+              <a:t>Tools we used	</a:t>
+            </a:r>
+            <a:endParaRPr lang="en-US" dirty="0"/>
           </a:p>
         </p:txBody>
       </p:sp>
@@ -3847,13 +3738,6 @@
   <p:clrMapOvr>
     <a:masterClrMapping/>
   </p:clrMapOvr>
-  <p:timing>
-    <p:tnLst>
-      <p:par>
-        <p:cTn id="1" dur="indefinite" restart="never" nodeType="tmRoot"/>
-      </p:par>
-    </p:tnLst>
-  </p:timing>
 </p:sld>
 </file>
 
@@ -3886,9 +3770,7 @@
         </p:nvSpPr>
         <p:spPr/>
         <p:txBody>
-          <a:bodyPr>
-            <a:normAutofit/>
-          </a:bodyPr>
+          <a:bodyPr/>
           <a:lstStyle/>
           <a:p>
             <a:r>
@@ -3896,21 +3778,8 @@
                 <a:latin typeface="Arial" pitchFamily="34" charset="0"/>
                 <a:cs typeface="Arial" pitchFamily="34" charset="0"/>
               </a:rPr>
-              <a:t>Add the missing moves/items to the game so that it is more complete</a:t>
-            </a:r>
-          </a:p>
-          <a:p>
-            <a:r>
-              <a:rPr lang="en-US" smtClean="0">
-                <a:latin typeface="Arial" pitchFamily="34" charset="0"/>
-                <a:cs typeface="Arial" pitchFamily="34" charset="0"/>
-              </a:rPr>
-              <a:t>Add new NPCs(trainers) to tournament mode</a:t>
-            </a:r>
-            <a:endParaRPr lang="en-US" dirty="0" smtClean="0">
-              <a:latin typeface="Arial" pitchFamily="34" charset="0"/>
-              <a:cs typeface="Arial" pitchFamily="34" charset="0"/>
-            </a:endParaRPr>
+              <a:t>Expanded the tournament game variant as it felt lackluster compared to the other created game modes</a:t>
+            </a:r>
           </a:p>
           <a:p>
             <a:r>
@@ -3918,21 +3787,16 @@
                 <a:latin typeface="Arial" pitchFamily="34" charset="0"/>
                 <a:cs typeface="Arial" pitchFamily="34" charset="0"/>
               </a:rPr>
-              <a:t>Learn about </a:t>
-            </a:r>
-            <a:r>
-              <a:rPr lang="en-US" dirty="0" err="1" smtClean="0">
-                <a:latin typeface="Arial" pitchFamily="34" charset="0"/>
-                <a:cs typeface="Arial" pitchFamily="34" charset="0"/>
-              </a:rPr>
-              <a:t>OCaml</a:t>
-            </a:r>
+              <a:t>Expanded the unlockable Pokémon field to include the full list</a:t>
+            </a:r>
+          </a:p>
+          <a:p>
             <a:r>
               <a:rPr lang="en-US" dirty="0" smtClean="0">
                 <a:latin typeface="Arial" pitchFamily="34" charset="0"/>
                 <a:cs typeface="Arial" pitchFamily="34" charset="0"/>
               </a:rPr>
-              <a:t>(a new language) in order to work on this project</a:t>
+              <a:t>Added our own unique NPC’s to the game</a:t>
             </a:r>
           </a:p>
           <a:p>
@@ -3941,54 +3805,32 @@
                 <a:latin typeface="Arial" pitchFamily="34" charset="0"/>
                 <a:cs typeface="Arial" pitchFamily="34" charset="0"/>
               </a:rPr>
-              <a:t>Learn about working in a group environment and meeting deadlines</a:t>
-            </a:r>
-          </a:p>
+              <a:t>Added documentation on how to install and play the game so that more people could play it</a:t>
+            </a:r>
+          </a:p>
+        </p:txBody>
+      </p:sp>
+      <p:sp>
+        <p:nvSpPr>
+          <p:cNvPr id="3" name="Title 2"/>
+          <p:cNvSpPr>
+            <a:spLocks noGrp="1"/>
+          </p:cNvSpPr>
+          <p:nvPr>
+            <p:ph type="title"/>
+          </p:nvPr>
+        </p:nvSpPr>
+        <p:spPr/>
+        <p:txBody>
+          <a:bodyPr/>
+          <a:lstStyle/>
           <a:p>
             <a:r>
               <a:rPr lang="en-US" dirty="0" smtClean="0">
                 <a:latin typeface="Arial" pitchFamily="34" charset="0"/>
                 <a:cs typeface="Arial" pitchFamily="34" charset="0"/>
               </a:rPr>
-              <a:t>Learn how to give and receive code reviews </a:t>
-            </a:r>
-          </a:p>
-          <a:p>
-            <a:r>
-              <a:rPr lang="en-US" dirty="0" smtClean="0">
-                <a:latin typeface="Arial" pitchFamily="34" charset="0"/>
-                <a:cs typeface="Arial" pitchFamily="34" charset="0"/>
-              </a:rPr>
-              <a:t>Get our fork accepted by the main repository so that we contribute back to the source</a:t>
-            </a:r>
-            <a:endParaRPr lang="en-US" dirty="0">
-              <a:latin typeface="Arial" pitchFamily="34" charset="0"/>
-              <a:cs typeface="Arial" pitchFamily="34" charset="0"/>
-            </a:endParaRPr>
-          </a:p>
-        </p:txBody>
-      </p:sp>
-      <p:sp>
-        <p:nvSpPr>
-          <p:cNvPr id="3" name="Title 2"/>
-          <p:cNvSpPr>
-            <a:spLocks noGrp="1"/>
-          </p:cNvSpPr>
-          <p:nvPr>
-            <p:ph type="title"/>
-          </p:nvPr>
-        </p:nvSpPr>
-        <p:spPr/>
-        <p:txBody>
-          <a:bodyPr/>
-          <a:lstStyle/>
-          <a:p>
-            <a:r>
-              <a:rPr lang="en-US" dirty="0" smtClean="0">
-                <a:latin typeface="Arial" pitchFamily="34" charset="0"/>
-                <a:cs typeface="Arial" pitchFamily="34" charset="0"/>
-              </a:rPr>
-              <a:t>Objectives/Learning Outcomes</a:t>
+              <a:t>What we did	</a:t>
             </a:r>
             <a:endParaRPr lang="en-US" dirty="0">
               <a:latin typeface="Arial" pitchFamily="34" charset="0"/>
@@ -4002,6 +3844,13 @@
   <p:clrMapOvr>
     <a:masterClrMapping/>
   </p:clrMapOvr>
+  <p:timing>
+    <p:tnLst>
+      <p:par>
+        <p:cTn id="1" dur="indefinite" restart="never" nodeType="tmRoot"/>
+      </p:par>
+    </p:tnLst>
+  </p:timing>
 </p:sld>
 </file>
 
@@ -4024,90 +3873,50 @@
       </p:grpSpPr>
       <p:sp>
         <p:nvSpPr>
-          <p:cNvPr id="2" name="Content Placeholder 1"/>
-          <p:cNvSpPr>
-            <a:spLocks noGrp="1"/>
-          </p:cNvSpPr>
+          <p:cNvPr id="3" name="Title 2"/>
+          <p:cNvSpPr>
+            <a:spLocks noGrp="1"/>
+          </p:cNvSpPr>
+          <p:nvPr>
+            <p:ph type="title"/>
+          </p:nvPr>
+        </p:nvSpPr>
+        <p:spPr/>
+        <p:txBody>
+          <a:bodyPr/>
+          <a:lstStyle/>
+          <a:p>
+            <a:r>
+              <a:rPr lang="en-US" dirty="0" smtClean="0"/>
+              <a:t>NPCS We added</a:t>
+            </a:r>
+            <a:endParaRPr lang="en-US" dirty="0"/>
+          </a:p>
+        </p:txBody>
+      </p:sp>
+      <p:pic>
+        <p:nvPicPr>
+          <p:cNvPr id="6" name="Content Placeholder 5" descr="Current_NPC_Sprites.png"/>
+          <p:cNvPicPr>
+            <a:picLocks noGrp="1" noChangeAspect="1"/>
+          </p:cNvPicPr>
           <p:nvPr>
             <p:ph idx="1"/>
           </p:nvPr>
-        </p:nvSpPr>
-        <p:spPr/>
-        <p:txBody>
-          <a:bodyPr>
-            <a:normAutofit lnSpcReduction="10000"/>
-          </a:bodyPr>
-          <a:lstStyle/>
-          <a:p>
-            <a:r>
-              <a:rPr lang="en-US" dirty="0" smtClean="0"/>
-              <a:t>We will separately work on each category we are adding, </a:t>
-            </a:r>
-            <a:r>
-              <a:rPr lang="en-US" dirty="0" err="1" smtClean="0"/>
-              <a:t>ie</a:t>
-            </a:r>
-            <a:r>
-              <a:rPr lang="en-US" dirty="0" smtClean="0"/>
-              <a:t> moves/items/NPC’s</a:t>
-            </a:r>
-          </a:p>
-          <a:p>
-            <a:r>
-              <a:rPr lang="en-US" dirty="0" smtClean="0"/>
-              <a:t>We expect to be able to work with the project’s creators if any problems arise</a:t>
-            </a:r>
-          </a:p>
-          <a:p>
-            <a:r>
-              <a:rPr lang="en-US" dirty="0" smtClean="0"/>
-              <a:t>At the end we will send a pull request to the master branch</a:t>
-            </a:r>
-          </a:p>
-          <a:p>
-            <a:r>
-              <a:rPr lang="en-US" dirty="0" smtClean="0"/>
-              <a:t>This project will be sustainable as we are filling in the missing information and there is always more features to add</a:t>
-            </a:r>
-          </a:p>
-          <a:p>
-            <a:r>
-              <a:rPr lang="en-US" dirty="0" smtClean="0"/>
-              <a:t>They are trying to port this game to windows so our changes will be transferred to that </a:t>
-            </a:r>
-            <a:r>
-              <a:rPr lang="en-US" smtClean="0"/>
-              <a:t>new version</a:t>
-            </a:r>
-            <a:endParaRPr lang="en-US" dirty="0"/>
-          </a:p>
-        </p:txBody>
-      </p:sp>
-      <p:sp>
-        <p:nvSpPr>
-          <p:cNvPr id="3" name="Title 2"/>
-          <p:cNvSpPr>
-            <a:spLocks noGrp="1"/>
-          </p:cNvSpPr>
-          <p:nvPr>
-            <p:ph type="title"/>
-          </p:nvPr>
-        </p:nvSpPr>
-        <p:spPr/>
-        <p:txBody>
-          <a:bodyPr>
-            <a:normAutofit fontScale="90000"/>
-          </a:bodyPr>
-          <a:lstStyle/>
-          <a:p>
-            <a:r>
-              <a:rPr lang="en-US" dirty="0" smtClean="0"/>
-              <a:t>Division of Work/Community Formation/Sustainability		</a:t>
-            </a:r>
-            <a:endParaRPr lang="en-US" dirty="0"/>
-          </a:p>
-        </p:txBody>
-      </p:sp>
+        </p:nvPicPr>
+        <p:blipFill>
+          <a:blip r:embed="rId2" cstate="print"/>
+          <a:stretch>
+            <a:fillRect/>
+          </a:stretch>
+        </p:blipFill>
+        <p:spPr>
+          <a:xfrm>
+            <a:off x="3123231" y="2723423"/>
+            <a:ext cx="2897538" cy="2173153"/>
+          </a:xfrm>
+        </p:spPr>
+      </p:pic>
     </p:spTree>
   </p:cSld>
   <p:clrMapOvr>
@@ -4133,15 +3942,38 @@
           <a:chExt cx="0" cy="0"/>
         </a:xfrm>
       </p:grpSpPr>
-      <p:sp>
-        <p:nvSpPr>
-          <p:cNvPr id="2" name="Content Placeholder 1"/>
-          <p:cNvSpPr>
-            <a:spLocks noGrp="1"/>
-          </p:cNvSpPr>
+      <p:pic>
+        <p:nvPicPr>
+          <p:cNvPr id="4" name="Content Placeholder 3" descr="Current_NPC_Portraits.png"/>
+          <p:cNvPicPr>
+            <a:picLocks noGrp="1" noChangeAspect="1"/>
+          </p:cNvPicPr>
           <p:nvPr>
             <p:ph idx="1"/>
           </p:nvPr>
+        </p:nvPicPr>
+        <p:blipFill>
+          <a:blip r:embed="rId2" cstate="print"/>
+          <a:stretch>
+            <a:fillRect/>
+          </a:stretch>
+        </p:blipFill>
+        <p:spPr>
+          <a:xfrm>
+            <a:off x="1821050" y="1524000"/>
+            <a:ext cx="5501899" cy="4572000"/>
+          </a:xfrm>
+        </p:spPr>
+      </p:pic>
+      <p:sp>
+        <p:nvSpPr>
+          <p:cNvPr id="3" name="Title 2"/>
+          <p:cNvSpPr>
+            <a:spLocks noGrp="1"/>
+          </p:cNvSpPr>
+          <p:nvPr>
+            <p:ph type="title"/>
+          </p:nvPr>
         </p:nvSpPr>
         <p:spPr/>
         <p:txBody>
@@ -4150,58 +3982,7 @@
           <a:p>
             <a:r>
               <a:rPr lang="en-US" dirty="0" smtClean="0"/>
-              <a:t>Weeks 1 – 3 : Learn </a:t>
-            </a:r>
-            <a:r>
-              <a:rPr lang="en-US" dirty="0" err="1" smtClean="0"/>
-              <a:t>Ocaml</a:t>
-            </a:r>
-            <a:r>
-              <a:rPr lang="en-US" dirty="0" smtClean="0"/>
-              <a:t> and get familiar with the environment</a:t>
-            </a:r>
-          </a:p>
-          <a:p>
-            <a:r>
-              <a:rPr lang="en-US" dirty="0" smtClean="0"/>
-              <a:t>Weeks 4-6: Start adding the project and working on the goals we set out to achieve. Add items/</a:t>
-            </a:r>
-            <a:r>
-              <a:rPr lang="en-US" dirty="0" err="1" smtClean="0"/>
-              <a:t>npcs</a:t>
-            </a:r>
-            <a:r>
-              <a:rPr lang="en-US" dirty="0" smtClean="0"/>
-              <a:t>/moves to the game</a:t>
-            </a:r>
-          </a:p>
-          <a:p>
-            <a:r>
-              <a:rPr lang="en-US" dirty="0" smtClean="0"/>
-              <a:t>Week 7: Review our code and get ready to submit back to the main repository</a:t>
-            </a:r>
-            <a:endParaRPr lang="en-US" dirty="0"/>
-          </a:p>
-        </p:txBody>
-      </p:sp>
-      <p:sp>
-        <p:nvSpPr>
-          <p:cNvPr id="3" name="Title 2"/>
-          <p:cNvSpPr>
-            <a:spLocks noGrp="1"/>
-          </p:cNvSpPr>
-          <p:nvPr>
-            <p:ph type="title"/>
-          </p:nvPr>
-        </p:nvSpPr>
-        <p:spPr/>
-        <p:txBody>
-          <a:bodyPr/>
-          <a:lstStyle/>
-          <a:p>
-            <a:r>
-              <a:rPr lang="en-US" dirty="0" smtClean="0"/>
-              <a:t>Schedule	</a:t>
+              <a:t>NPC Portraits we added</a:t>
             </a:r>
             <a:endParaRPr lang="en-US" dirty="0"/>
           </a:p>
@@ -4232,129 +4013,58 @@
           <a:chExt cx="0" cy="0"/>
         </a:xfrm>
       </p:grpSpPr>
-      <p:pic>
-        <p:nvPicPr>
-          <p:cNvPr id="9" name="Content Placeholder 8" descr="2016-03-24-174702_1920x950_scrot.png"/>
-          <p:cNvPicPr>
-            <a:picLocks noGrp="1" noChangeAspect="1"/>
-          </p:cNvPicPr>
+      <p:sp>
+        <p:nvSpPr>
+          <p:cNvPr id="2" name="Content Placeholder 1"/>
+          <p:cNvSpPr>
+            <a:spLocks noGrp="1"/>
+          </p:cNvSpPr>
           <p:nvPr>
             <p:ph idx="1"/>
           </p:nvPr>
-        </p:nvPicPr>
-        <p:blipFill>
-          <a:blip r:embed="rId2" cstate="print"/>
-          <a:srcRect l="15017" t="18968" r="53073" b="26023"/>
-          <a:stretch>
-            <a:fillRect/>
-          </a:stretch>
-        </p:blipFill>
-        <p:spPr>
-          <a:xfrm>
-            <a:off x="685800" y="152400"/>
-            <a:ext cx="7388352" cy="6301831"/>
-          </a:xfrm>
-        </p:spPr>
-      </p:pic>
-    </p:spTree>
-  </p:cSld>
-  <p:clrMapOvr>
-    <a:masterClrMapping/>
-  </p:clrMapOvr>
-</p:sld>
-</file>
-
-<file path=ppt/slides/slide8.xml><?xml version="1.0" encoding="utf-8"?>
-<p:sld xmlns:a="http://schemas.openxmlformats.org/drawingml/2006/main" xmlns:r="http://schemas.openxmlformats.org/officeDocument/2006/relationships" xmlns:p="http://schemas.openxmlformats.org/presentationml/2006/main">
-  <p:cSld>
-    <p:spTree>
-      <p:nvGrpSpPr>
-        <p:cNvPr id="1" name=""/>
-        <p:cNvGrpSpPr/>
-        <p:nvPr/>
-      </p:nvGrpSpPr>
-      <p:grpSpPr>
-        <a:xfrm>
-          <a:off x="0" y="0"/>
-          <a:ext cx="0" cy="0"/>
-          <a:chOff x="0" y="0"/>
-          <a:chExt cx="0" cy="0"/>
-        </a:xfrm>
-      </p:grpSpPr>
-      <p:pic>
-        <p:nvPicPr>
-          <p:cNvPr id="4" name="Content Placeholder 3" descr="2016-03-25-020823_1920x950_scrot.png"/>
-          <p:cNvPicPr>
-            <a:picLocks noGrp="1" noChangeAspect="1"/>
-          </p:cNvPicPr>
-          <p:nvPr>
-            <p:ph idx="1"/>
-          </p:nvPr>
-        </p:nvPicPr>
-        <p:blipFill>
-          <a:blip r:embed="rId2" cstate="print"/>
-          <a:srcRect r="69444" b="44386"/>
-          <a:stretch>
-            <a:fillRect/>
-          </a:stretch>
-        </p:blipFill>
-        <p:spPr>
-          <a:xfrm>
-            <a:off x="609600" y="0"/>
-            <a:ext cx="7384429" cy="6650183"/>
-          </a:xfrm>
-        </p:spPr>
-      </p:pic>
-    </p:spTree>
-  </p:cSld>
-  <p:clrMapOvr>
-    <a:masterClrMapping/>
-  </p:clrMapOvr>
-</p:sld>
-</file>
-
-<file path=ppt/slides/slide9.xml><?xml version="1.0" encoding="utf-8"?>
-<p:sld xmlns:a="http://schemas.openxmlformats.org/drawingml/2006/main" xmlns:r="http://schemas.openxmlformats.org/officeDocument/2006/relationships" xmlns:p="http://schemas.openxmlformats.org/presentationml/2006/main">
-  <p:cSld>
-    <p:spTree>
-      <p:nvGrpSpPr>
-        <p:cNvPr id="1" name=""/>
-        <p:cNvGrpSpPr/>
-        <p:nvPr/>
-      </p:nvGrpSpPr>
-      <p:grpSpPr>
-        <a:xfrm>
-          <a:off x="0" y="0"/>
-          <a:ext cx="0" cy="0"/>
-          <a:chOff x="0" y="0"/>
-          <a:chExt cx="0" cy="0"/>
-        </a:xfrm>
-      </p:grpSpPr>
-      <p:pic>
-        <p:nvPicPr>
-          <p:cNvPr id="4" name="Picture 3" descr="2016-03-25-020834_1920x950_scrot.png"/>
-          <p:cNvPicPr>
-            <a:picLocks noChangeAspect="1"/>
-          </p:cNvPicPr>
-          <p:nvPr/>
-        </p:nvPicPr>
-        <p:blipFill>
-          <a:blip r:embed="rId2" cstate="print"/>
-          <a:srcRect r="68333" b="44947"/>
-          <a:stretch>
-            <a:fillRect/>
-          </a:stretch>
-        </p:blipFill>
-        <p:spPr>
-          <a:xfrm>
-            <a:off x="762000" y="228600"/>
-            <a:ext cx="7388352" cy="6355442"/>
-          </a:xfrm>
-          <a:prstGeom prst="rect">
-            <a:avLst/>
-          </a:prstGeom>
-        </p:spPr>
-      </p:pic>
+        </p:nvSpPr>
+        <p:spPr/>
+        <p:txBody>
+          <a:bodyPr/>
+          <a:lstStyle/>
+          <a:p>
+            <a:r>
+              <a:rPr lang="en-US" dirty="0" smtClean="0"/>
+              <a:t>Trying to learn OCaml and change parts of the game, such as the logic units, was very hard</a:t>
+            </a:r>
+          </a:p>
+          <a:p>
+            <a:r>
+              <a:rPr lang="en-US" dirty="0" smtClean="0"/>
+              <a:t>We face time constraints we could not add the items/moves as we had planned</a:t>
+            </a:r>
+            <a:endParaRPr lang="en-US" dirty="0"/>
+          </a:p>
+        </p:txBody>
+      </p:sp>
+      <p:sp>
+        <p:nvSpPr>
+          <p:cNvPr id="3" name="Title 2"/>
+          <p:cNvSpPr>
+            <a:spLocks noGrp="1"/>
+          </p:cNvSpPr>
+          <p:nvPr>
+            <p:ph type="title"/>
+          </p:nvPr>
+        </p:nvSpPr>
+        <p:spPr/>
+        <p:txBody>
+          <a:bodyPr/>
+          <a:lstStyle/>
+          <a:p>
+            <a:r>
+              <a:rPr lang="en-US" dirty="0" smtClean="0"/>
+              <a:t>Problems we Faced</a:t>
+            </a:r>
+            <a:endParaRPr lang="en-US" dirty="0"/>
+          </a:p>
+        </p:txBody>
+      </p:sp>
     </p:spTree>
   </p:cSld>
   <p:clrMapOvr>

</xml_diff>